<commit_message>
working on another normalization
</commit_message>
<xml_diff>
--- a/presentations/index.pptx
+++ b/presentations/index.pptx
@@ -7935,12 +7935,12 @@
         <mc:Choice xmlns:a14="http://schemas.microsoft.com/office/drawing/2010/main" Requires="a14">
           <p:sp>
             <p:nvSpPr>
-              <p:cNvPr id="3" name="Content Placeholder 2"/>
+              <p:cNvPr id="4" name="Text Placeholder 3"/>
               <p:cNvSpPr>
                 <a:spLocks noGrp="1"/>
               </p:cNvSpPr>
               <p:nvPr>
-                <p:ph idx="1"/>
+                <p:ph idx="2" sz="half" type="body"/>
               </p:nvPr>
             </p:nvSpPr>
             <p:spPr/>
@@ -10930,10 +10930,514 @@
                   <a:t>]</a:t>
                 </a:r>
               </a:p>
+              <a:p>
+                <a:pPr lvl="0" indent="0" marL="0">
+                  <a:buNone/>
+                </a:pPr>
+                <a:r>
+                  <a:rPr/>
+                  <a:t>For the same asymptotic magnetic field, it is interesting to see how the plasma profiles change with different system parameters.</a:t>
+                </a:r>
+              </a:p>
+              <a:p>
+                <a:pPr lvl="0" indent="0" marL="0">
+                  <a:buNone/>
+                </a:pPr>
+                <a14:m>
+                  <m:oMathPara xmlns:m="http://schemas.openxmlformats.org/officeDocument/2006/math">
+                    <m:oMathParaPr>
+                      <m:jc m:val="center"/>
+                    </m:oMathParaPr>
+                    <m:oMath>
+                      <m:r>
+                        <m:rPr>
+                          <m:nor/>
+                          <m:sty m:val="p"/>
+                        </m:rPr>
+                        <m:t>cond</m:t>
+                      </m:r>
+                      <m:d>
+                        <m:dPr>
+                          <m:begChr m:val="("/>
+                          <m:endChr m:val=")"/>
+                          <m:sepChr m:val=""/>
+                          <m:grow/>
+                        </m:dPr>
+                        <m:e>
+                          <m:r>
+                            <m:t>n</m:t>
+                          </m:r>
+                          <m:d>
+                            <m:dPr>
+                              <m:begChr m:val="("/>
+                              <m:endChr m:val=")"/>
+                              <m:sepChr m:val=""/>
+                              <m:grow/>
+                            </m:dPr>
+                            <m:e>
+                              <m:r>
+                                <m:t>z</m:t>
+                              </m:r>
+                            </m:e>
+                          </m:d>
+                          <m:r>
+                            <m:rPr>
+                              <m:sty m:val="p"/>
+                            </m:rPr>
+                            <m:t>,</m:t>
+                          </m:r>
+                          <m:sSub>
+                            <m:e>
+                              <m:r>
+                                <m:t>λ</m:t>
+                              </m:r>
+                            </m:e>
+                            <m:sub>
+                              <m:r>
+                                <m:t>n</m:t>
+                              </m:r>
+                              <m:r>
+                                <m:rPr>
+                                  <m:sty m:val="p"/>
+                                </m:rPr>
+                                <m:t>,</m:t>
+                              </m:r>
+                              <m:r>
+                                <m:rPr>
+                                  <m:sty m:val="p"/>
+                                </m:rPr>
+                                <m:t>∞</m:t>
+                              </m:r>
+                            </m:sub>
+                          </m:sSub>
+                          <m:r>
+                            <m:rPr>
+                              <m:sty m:val="p"/>
+                            </m:rPr>
+                            <m:t>,</m:t>
+                          </m:r>
+                          <m:sSub>
+                            <m:e>
+                              <m:r>
+                                <m:t>λ</m:t>
+                              </m:r>
+                            </m:e>
+                            <m:sub>
+                              <m:r>
+                                <m:t>z</m:t>
+                              </m:r>
+                              <m:r>
+                                <m:rPr>
+                                  <m:sty m:val="p"/>
+                                </m:rPr>
+                                <m:t>,</m:t>
+                              </m:r>
+                              <m:r>
+                                <m:rPr>
+                                  <m:sty m:val="p"/>
+                                </m:rPr>
+                                <m:t>∞</m:t>
+                              </m:r>
+                            </m:sub>
+                          </m:sSub>
+                        </m:e>
+                      </m:d>
+                      <m:r>
+                        <m:rPr>
+                          <m:sty m:val="p"/>
+                        </m:rPr>
+                        <m:t>=</m:t>
+                      </m:r>
+                      <m:r>
+                        <m:t>0</m:t>
+                      </m:r>
+                    </m:oMath>
+                  </m:oMathPara>
+                </a14:m>
+              </a:p>
+              <a:p>
+                <a:pPr lvl="0" indent="0" marL="0">
+                  <a:buNone/>
+                </a:pPr>
+                <a:r>
+                  <a:rPr/>
+                  <a:t>Here we set </a:t>
+                </a:r>
+                <a14:m>
+                  <m:oMath xmlns:m="http://schemas.openxmlformats.org/officeDocument/2006/math">
+                    <m:sSub>
+                      <m:e>
+                        <m:r>
+                          <m:t>B</m:t>
+                        </m:r>
+                      </m:e>
+                      <m:sub>
+                        <m:r>
+                          <m:t>y</m:t>
+                        </m:r>
+                      </m:sub>
+                    </m:sSub>
+                    <m:d>
+                      <m:dPr>
+                        <m:begChr m:val="("/>
+                        <m:endChr m:val=")"/>
+                        <m:sepChr m:val=""/>
+                        <m:grow/>
+                      </m:dPr>
+                      <m:e>
+                        <m:r>
+                          <m:t>z</m:t>
+                        </m:r>
+                        <m:r>
+                          <m:rPr>
+                            <m:sty m:val="p"/>
+                          </m:rPr>
+                          <m:t>=</m:t>
+                        </m:r>
+                        <m:r>
+                          <m:rPr>
+                            <m:sty m:val="p"/>
+                          </m:rPr>
+                          <m:t>∞</m:t>
+                        </m:r>
+                      </m:e>
+                    </m:d>
+                    <m:r>
+                      <m:rPr>
+                        <m:sty m:val="p"/>
+                      </m:rPr>
+                      <m:t>=</m:t>
+                    </m:r>
+                    <m:r>
+                      <m:t>1</m:t>
+                    </m:r>
+                    <m:r>
+                      <m:rPr>
+                        <m:sty m:val="p"/>
+                      </m:rPr>
+                      <m:t>/</m:t>
+                    </m:r>
+                    <m:r>
+                      <m:t>2</m:t>
+                    </m:r>
+                    <m:sSub>
+                      <m:e>
+                        <m:r>
+                          <m:t>B</m:t>
+                        </m:r>
+                      </m:e>
+                      <m:sub>
+                        <m:r>
+                          <m:t>y</m:t>
+                        </m:r>
+                      </m:sub>
+                    </m:sSub>
+                    <m:d>
+                      <m:dPr>
+                        <m:begChr m:val="("/>
+                        <m:endChr m:val=")"/>
+                        <m:sepChr m:val=""/>
+                        <m:grow/>
+                      </m:dPr>
+                      <m:e>
+                        <m:r>
+                          <m:t>z</m:t>
+                        </m:r>
+                        <m:r>
+                          <m:rPr>
+                            <m:sty m:val="p"/>
+                          </m:rPr>
+                          <m:t>=</m:t>
+                        </m:r>
+                        <m:r>
+                          <m:t>0</m:t>
+                        </m:r>
+                      </m:e>
+                    </m:d>
+                  </m:oMath>
+                </a14:m>
+                <a:r>
+                  <a:rPr/>
+                  <a:t> and </a:t>
+                </a:r>
+                <a14:m>
+                  <m:oMath xmlns:m="http://schemas.openxmlformats.org/officeDocument/2006/math">
+                    <m:sSub>
+                      <m:e>
+                        <m:r>
+                          <m:t>B</m:t>
+                        </m:r>
+                      </m:e>
+                      <m:sub>
+                        <m:r>
+                          <m:t>0</m:t>
+                        </m:r>
+                      </m:sub>
+                    </m:sSub>
+                    <m:r>
+                      <m:rPr>
+                        <m:sty m:val="p"/>
+                      </m:rPr>
+                      <m:t>=</m:t>
+                    </m:r>
+                    <m:r>
+                      <m:t>2</m:t>
+                    </m:r>
+                    <m:sSub>
+                      <m:e>
+                        <m:r>
+                          <m:t>B</m:t>
+                        </m:r>
+                      </m:e>
+                      <m:sub>
+                        <m:r>
+                          <m:t>z</m:t>
+                        </m:r>
+                      </m:sub>
+                    </m:sSub>
+                  </m:oMath>
+                </a14:m>
+                <a:r>
+                  <a:rPr/>
+                  <a:t>, and fix </a:t>
+                </a:r>
+                <a14:m>
+                  <m:oMath xmlns:m="http://schemas.openxmlformats.org/officeDocument/2006/math">
+                    <m:sSub>
+                      <m:e>
+                        <m:r>
+                          <m:t>λ</m:t>
+                        </m:r>
+                      </m:e>
+                      <m:sub>
+                        <m:r>
+                          <m:t>z</m:t>
+                        </m:r>
+                        <m:r>
+                          <m:rPr>
+                            <m:sty m:val="p"/>
+                          </m:rPr>
+                          <m:t>,</m:t>
+                        </m:r>
+                        <m:r>
+                          <m:rPr>
+                            <m:sty m:val="p"/>
+                          </m:rPr>
+                          <m:t>∞</m:t>
+                        </m:r>
+                      </m:sub>
+                    </m:sSub>
+                    <m:r>
+                      <m:rPr>
+                        <m:sty m:val="p"/>
+                      </m:rPr>
+                      <m:t>=</m:t>
+                    </m:r>
+                    <m:r>
+                      <m:rPr>
+                        <m:sty m:val="p"/>
+                      </m:rPr>
+                      <m:t>−</m:t>
+                    </m:r>
+                    <m:r>
+                      <m:t>1</m:t>
+                    </m:r>
+                  </m:oMath>
+                </a14:m>
+                <a:r>
+                  <a:rPr/>
+                  <a:t>. By varying </a:t>
+                </a:r>
+                <a14:m>
+                  <m:oMath xmlns:m="http://schemas.openxmlformats.org/officeDocument/2006/math">
+                    <m:sSub>
+                      <m:e>
+                        <m:r>
+                          <m:t>λ</m:t>
+                        </m:r>
+                      </m:e>
+                      <m:sub>
+                        <m:r>
+                          <m:t>n</m:t>
+                        </m:r>
+                        <m:r>
+                          <m:rPr>
+                            <m:sty m:val="p"/>
+                          </m:rPr>
+                          <m:t>,</m:t>
+                        </m:r>
+                        <m:r>
+                          <m:rPr>
+                            <m:sty m:val="p"/>
+                          </m:rPr>
+                          <m:t>∞</m:t>
+                        </m:r>
+                      </m:sub>
+                    </m:sSub>
+                  </m:oMath>
+                </a14:m>
+                <a:r>
+                  <a:rPr/>
+                  <a:t>, we find that the magnetic field profiles are exactly the same, while plasma velocity profiles vary. We normalize the plasma velocity by asympotic Alfvén velocity </a:t>
+                </a:r>
+                <a14:m>
+                  <m:oMath xmlns:m="http://schemas.openxmlformats.org/officeDocument/2006/math">
+                    <m:sSub>
+                      <m:e>
+                        <m:r>
+                          <m:t>v</m:t>
+                        </m:r>
+                      </m:e>
+                      <m:sub>
+                        <m:r>
+                          <m:t>A</m:t>
+                        </m:r>
+                        <m:r>
+                          <m:rPr>
+                            <m:sty m:val="p"/>
+                          </m:rPr>
+                          <m:t>,</m:t>
+                        </m:r>
+                        <m:r>
+                          <m:rPr>
+                            <m:sty m:val="p"/>
+                          </m:rPr>
+                          <m:t>∞</m:t>
+                        </m:r>
+                      </m:sub>
+                    </m:sSub>
+                    <m:r>
+                      <m:rPr>
+                        <m:sty m:val="p"/>
+                      </m:rPr>
+                      <m:t>=</m:t>
+                    </m:r>
+                    <m:sSub>
+                      <m:e>
+                        <m:r>
+                          <m:t>B</m:t>
+                        </m:r>
+                      </m:e>
+                      <m:sub>
+                        <m:r>
+                          <m:t>0</m:t>
+                        </m:r>
+                      </m:sub>
+                    </m:sSub>
+                    <m:r>
+                      <m:rPr>
+                        <m:sty m:val="p"/>
+                      </m:rPr>
+                      <m:t>/</m:t>
+                    </m:r>
+                    <m:rad>
+                      <m:radPr>
+                        <m:degHide m:val="on"/>
+                      </m:radPr>
+                      <m:deg/>
+                      <m:e>
+                        <m:r>
+                          <m:t>n</m:t>
+                        </m:r>
+                      </m:e>
+                    </m:rad>
+                  </m:oMath>
+                </a14:m>
+                <a:r>
+                  <a:rPr/>
+                  <a:t>, and the profiles are plotted below Figure 1 (b). It could be seen that for </a:t>
+                </a:r>
+                <a14:m>
+                  <m:oMath xmlns:m="http://schemas.openxmlformats.org/officeDocument/2006/math">
+                    <m:sSub>
+                      <m:e>
+                        <m:r>
+                          <m:t>λ</m:t>
+                        </m:r>
+                      </m:e>
+                      <m:sub>
+                        <m:r>
+                          <m:t>n</m:t>
+                        </m:r>
+                        <m:r>
+                          <m:rPr>
+                            <m:sty m:val="p"/>
+                          </m:rPr>
+                          <m:t>,</m:t>
+                        </m:r>
+                        <m:r>
+                          <m:rPr>
+                            <m:sty m:val="p"/>
+                          </m:rPr>
+                          <m:t>∞</m:t>
+                        </m:r>
+                      </m:sub>
+                    </m:sSub>
+                    <m:r>
+                      <m:rPr>
+                        <m:sty m:val="p"/>
+                      </m:rPr>
+                      <m:t>=</m:t>
+                    </m:r>
+                    <m:r>
+                      <m:t>1</m:t>
+                    </m:r>
+                  </m:oMath>
+                </a14:m>
+                <a:r>
+                  <a:rPr/>
+                  <a:t>, we have zero bulk velocity change across the current sheet in the asymptotic limit.</a:t>
+                </a:r>
+              </a:p>
+              <a:p>
+                <a:pPr lvl="0" indent="0" marL="0">
+                  <a:buNone/>
+                </a:pPr>
+              </a:p>
+              <a:p>
+                <a:pPr lvl="0" indent="0" marL="0">
+                  <a:buNone/>
+                </a:pPr>
+              </a:p>
+              <a:p>
+                <a:pPr lvl="0" indent="0" marL="0">
+                  <a:buNone/>
+                </a:pPr>
+              </a:p>
             </p:txBody>
           </p:sp>
         </mc:Choice>
       </mc:AlternateContent>
+      <p:pic>
+        <p:nvPicPr>
+          <p:cNvPr descr="figures/vRatios.svg" id="0" name="Picture 1"/>
+          <p:cNvPicPr>
+            <a:picLocks noGrp="1" noChangeAspect="1"/>
+          </p:cNvPicPr>
+          <p:nvPr/>
+        </p:nvPicPr>
+        <p:blipFill>
+          <a:blip r:embed="rId2"/>
+          <a:stretch>
+            <a:fillRect/>
+          </a:stretch>
+        </p:blipFill>
+        <p:spPr bwMode="auto">
+          <a:xfrm>
+            <a:off x="3568700" y="1270000"/>
+            <a:ext cx="5105400" cy="2260600"/>
+          </a:xfrm>
+          <a:prstGeom prst="rect">
+            <a:avLst/>
+          </a:prstGeom>
+          <a:noFill/>
+          <a:ln w="9525">
+            <a:noFill/>
+            <a:headEnd/>
+            <a:tailEnd/>
+          </a:ln>
+        </p:spPr>
+      </p:pic>
     </p:spTree>
   </p:cSld>
 </p:sld>
@@ -11027,6 +11531,347 @@
             <a:r>
               <a:rPr/>
               <a:t>Steinhauer, McCarthy, and Whipple (2008)</a:t>
+            </a:r>
+          </a:p>
+          <a:p>
+            <a:pPr lvl="0" indent="0">
+              <a:buNone/>
+            </a:pPr>
+            <a:r>
+              <a:rPr>
+                <a:solidFill>
+                  <a:srgbClr val="003B4F"/>
+                </a:solidFill>
+                <a:latin typeface="Courier"/>
+              </a:rPr>
+              <a:t>conf = </a:t>
+            </a:r>
+            <a:r>
+              <a:rPr>
+                <a:solidFill>
+                  <a:srgbClr val="5E5E5E"/>
+                </a:solidFill>
+                <a:latin typeface="Courier"/>
+              </a:rPr>
+              <a:t>{</a:t>
+            </a:r>
+            <a:r>
+              <a:rPr>
+                <a:solidFill>
+                  <a:srgbClr val="003B4F"/>
+                </a:solidFill>
+                <a:latin typeface="Courier"/>
+              </a:rPr>
+              <a:t>ratio -&gt; </a:t>
+            </a:r>
+            <a:r>
+              <a:rPr>
+                <a:solidFill>
+                  <a:srgbClr val="AD0000"/>
+                </a:solidFill>
+                <a:latin typeface="Courier"/>
+              </a:rPr>
+              <a:t>1</a:t>
+            </a:r>
+            <a:r>
+              <a:rPr>
+                <a:solidFill>
+                  <a:srgbClr val="5E5E5E"/>
+                </a:solidFill>
+                <a:latin typeface="Courier"/>
+              </a:rPr>
+              <a:t>/</a:t>
+            </a:r>
+            <a:r>
+              <a:rPr>
+                <a:solidFill>
+                  <a:srgbClr val="AD0000"/>
+                </a:solidFill>
+                <a:latin typeface="Courier"/>
+              </a:rPr>
+              <a:t>2</a:t>
+            </a:r>
+            <a:r>
+              <a:rPr>
+                <a:solidFill>
+                  <a:srgbClr val="5E5E5E"/>
+                </a:solidFill>
+                <a:latin typeface="Courier"/>
+              </a:rPr>
+              <a:t>}</a:t>
+            </a:r>
+            <a:br/>
+            <a:r>
+              <a:rPr>
+                <a:solidFill>
+                  <a:srgbClr val="003B4F"/>
+                </a:solidFill>
+                <a:latin typeface="Courier"/>
+              </a:rPr>
+              <a:t>TextString</a:t>
+            </a:r>
+            <a:r>
+              <a:rPr>
+                <a:solidFill>
+                  <a:srgbClr val="5E5E5E"/>
+                </a:solidFill>
+                <a:latin typeface="Courier"/>
+              </a:rPr>
+              <a:t>[</a:t>
+            </a:r>
+            <a:r>
+              <a:rPr>
+                <a:solidFill>
+                  <a:srgbClr val="003B4F"/>
+                </a:solidFill>
+                <a:latin typeface="Courier"/>
+              </a:rPr>
+              <a:t>conf</a:t>
+            </a:r>
+            <a:r>
+              <a:rPr>
+                <a:solidFill>
+                  <a:srgbClr val="5E5E5E"/>
+                </a:solidFill>
+                <a:latin typeface="Courier"/>
+              </a:rPr>
+              <a:t>]</a:t>
+            </a:r>
+            <a:br/>
+            <a:r>
+              <a:rPr>
+                <a:solidFill>
+                  <a:srgbClr val="003B4F"/>
+                </a:solidFill>
+                <a:latin typeface="Courier"/>
+              </a:rPr>
+              <a:t>&lt;!</a:t>
+            </a:r>
+            <a:r>
+              <a:rPr>
+                <a:solidFill>
+                  <a:srgbClr val="5E5E5E"/>
+                </a:solidFill>
+                <a:latin typeface="Courier"/>
+              </a:rPr>
+              <a:t>--</a:t>
+            </a:r>
+            <a:r>
+              <a:rPr>
+                <a:solidFill>
+                  <a:srgbClr val="003B4F"/>
+                </a:solidFill>
+                <a:latin typeface="Courier"/>
+              </a:rPr>
+              <a:t> Convert </a:t>
+            </a:r>
+            <a:r>
+              <a:rPr>
+                <a:solidFill>
+                  <a:srgbClr val="4758AB"/>
+                </a:solidFill>
+                <a:latin typeface="Courier"/>
+              </a:rPr>
+              <a:t>a</a:t>
+            </a:r>
+            <a:r>
+              <a:rPr>
+                <a:solidFill>
+                  <a:srgbClr val="003B4F"/>
+                </a:solidFill>
+                <a:latin typeface="Courier"/>
+              </a:rPr>
+              <a:t> dict</a:t>
+            </a:r>
+            <a:r>
+              <a:rPr>
+                <a:solidFill>
+                  <a:srgbClr val="5E5E5E"/>
+                </a:solidFill>
+                <a:latin typeface="Courier"/>
+              </a:rPr>
+              <a:t>-</a:t>
+            </a:r>
+            <a:r>
+              <a:rPr>
+                <a:solidFill>
+                  <a:srgbClr val="003B4F"/>
+                </a:solidFill>
+                <a:latin typeface="Courier"/>
+              </a:rPr>
+              <a:t>like configuration to </a:t>
+            </a:r>
+            <a:r>
+              <a:rPr>
+                <a:solidFill>
+                  <a:srgbClr val="4758AB"/>
+                </a:solidFill>
+                <a:latin typeface="Courier"/>
+              </a:rPr>
+              <a:t>a</a:t>
+            </a:r>
+            <a:r>
+              <a:rPr>
+                <a:solidFill>
+                  <a:srgbClr val="003B4F"/>
+                </a:solidFill>
+                <a:latin typeface="Courier"/>
+              </a:rPr>
+              <a:t> </a:t>
+            </a:r>
+            <a:r>
+              <a:rPr>
+                <a:solidFill>
+                  <a:srgbClr val="4758AB"/>
+                </a:solidFill>
+                <a:latin typeface="Courier"/>
+              </a:rPr>
+              <a:t>string</a:t>
+            </a:r>
+            <a:r>
+              <a:rPr>
+                <a:solidFill>
+                  <a:srgbClr val="003B4F"/>
+                </a:solidFill>
+                <a:latin typeface="Courier"/>
+              </a:rPr>
+              <a:t> </a:t>
+            </a:r>
+            <a:r>
+              <a:rPr>
+                <a:solidFill>
+                  <a:srgbClr val="5E5E5E"/>
+                </a:solidFill>
+                <a:latin typeface="Courier"/>
+              </a:rPr>
+              <a:t>-</a:t>
+            </a:r>
+            <a:r>
+              <a:rPr>
+                <a:solidFill>
+                  <a:srgbClr val="003B4F"/>
+                </a:solidFill>
+                <a:latin typeface="Courier"/>
+              </a:rPr>
+              <a:t>-&gt;</a:t>
+            </a:r>
+            <a:br/>
+            <a:r>
+              <a:rPr>
+                <a:solidFill>
+                  <a:srgbClr val="003B4F"/>
+                </a:solidFill>
+                <a:latin typeface="Courier"/>
+              </a:rPr>
+              <a:t>saveName</a:t>
+            </a:r>
+            <a:r>
+              <a:rPr>
+                <a:solidFill>
+                  <a:srgbClr val="5E5E5E"/>
+                </a:solidFill>
+                <a:latin typeface="Courier"/>
+              </a:rPr>
+              <a:t>[</a:t>
+            </a:r>
+            <a:r>
+              <a:rPr>
+                <a:solidFill>
+                  <a:srgbClr val="657422"/>
+                </a:solidFill>
+                <a:latin typeface="Courier"/>
+              </a:rPr>
+              <a:t>c_</a:t>
+            </a:r>
+            <a:r>
+              <a:rPr>
+                <a:solidFill>
+                  <a:srgbClr val="5E5E5E"/>
+                </a:solidFill>
+                <a:latin typeface="Courier"/>
+              </a:rPr>
+              <a:t>]</a:t>
+            </a:r>
+            <a:r>
+              <a:rPr>
+                <a:solidFill>
+                  <a:srgbClr val="003B4F"/>
+                </a:solidFill>
+                <a:latin typeface="Courier"/>
+              </a:rPr>
+              <a:t> := </a:t>
+            </a:r>
+            <a:r>
+              <a:rPr>
+                <a:solidFill>
+                  <a:srgbClr val="4758AB"/>
+                </a:solidFill>
+                <a:latin typeface="Courier"/>
+              </a:rPr>
+              <a:t>StringJoin</a:t>
+            </a:r>
+            <a:r>
+              <a:rPr>
+                <a:solidFill>
+                  <a:srgbClr val="5E5E5E"/>
+                </a:solidFill>
+                <a:latin typeface="Courier"/>
+              </a:rPr>
+              <a:t>[</a:t>
+            </a:r>
+            <a:r>
+              <a:rPr>
+                <a:solidFill>
+                  <a:srgbClr val="4758AB"/>
+                </a:solidFill>
+                <a:latin typeface="Courier"/>
+              </a:rPr>
+              <a:t>ToString</a:t>
+            </a:r>
+            <a:r>
+              <a:rPr>
+                <a:solidFill>
+                  <a:srgbClr val="003B4F"/>
+                </a:solidFill>
+                <a:latin typeface="Courier"/>
+              </a:rPr>
+              <a:t> </a:t>
+            </a:r>
+            <a:r>
+              <a:rPr>
+                <a:solidFill>
+                  <a:srgbClr val="5E5E5E"/>
+                </a:solidFill>
+                <a:latin typeface="Courier"/>
+              </a:rPr>
+              <a:t>/</a:t>
+            </a:r>
+            <a:r>
+              <a:rPr>
+                <a:solidFill>
+                  <a:srgbClr val="003B4F"/>
+                </a:solidFill>
+                <a:latin typeface="Courier"/>
+              </a:rPr>
+              <a:t>@ </a:t>
+            </a:r>
+            <a:r>
+              <a:rPr>
+                <a:solidFill>
+                  <a:srgbClr val="4758AB"/>
+                </a:solidFill>
+                <a:latin typeface="Courier"/>
+              </a:rPr>
+              <a:t>c</a:t>
+            </a:r>
+            <a:r>
+              <a:rPr>
+                <a:solidFill>
+                  <a:srgbClr val="5E5E5E"/>
+                </a:solidFill>
+                <a:latin typeface="Courier"/>
+              </a:rPr>
+              <a:t>]</a:t>
             </a:r>
           </a:p>
           <a:p>
@@ -11547,54 +12392,541 @@
           <a:chExt cx="0" cy="0"/>
         </a:xfrm>
       </p:grpSpPr>
-      <p:sp>
-        <p:nvSpPr>
-          <p:cNvPr id="3" name="Content Placeholder 2"/>
-          <p:cNvSpPr>
-            <a:spLocks noGrp="1"/>
-          </p:cNvSpPr>
-          <p:nvPr>
-            <p:ph idx="1"/>
-          </p:nvPr>
-        </p:nvSpPr>
-        <p:spPr/>
-        <p:txBody>
-          <a:bodyPr/>
-          <a:lstStyle/>
-          <a:p>
-            <a:pPr lvl="0" indent="0" marL="0">
-              <a:buNone/>
-            </a:pPr>
-            <a:r>
-              <a:rPr/>
-              <a:t>However, observations of solar wind discontinuities reveals discrepancies between</a:t>
-            </a:r>
-          </a:p>
-          <a:p>
-            <a:pPr lvl="0"/>
-            <a:r>
-              <a:rPr/>
-              <a:t>Alfven velocity and plasma velocity change across discontinuities</a:t>
-            </a:r>
-          </a:p>
-          <a:p>
-            <a:pPr lvl="0"/>
-            <a:r>
-              <a:rPr/>
-              <a:t>Anisotropic MHD theory-predicted and directly measured ion anisotropies</a:t>
-            </a:r>
-          </a:p>
-          <a:p>
-            <a:pPr lvl="0" indent="0" marL="0">
-              <a:buNone/>
-            </a:pPr>
-            <a:r>
-              <a:rPr/>
-              <a:t>Multifluid theory is proposed to address these discrepancies. The basic idea is that we could have zero bulk velocity with non zero pressure.</a:t>
-            </a:r>
-          </a:p>
-        </p:txBody>
-      </p:sp>
+      <mc:AlternateContent xmlns:mc="http://schemas.openxmlformats.org/markup-compatibility/2006">
+        <mc:Choice xmlns:a14="http://schemas.microsoft.com/office/drawing/2010/main" Requires="a14">
+          <p:sp>
+            <p:nvSpPr>
+              <p:cNvPr id="3" name="Content Placeholder 2"/>
+              <p:cNvSpPr>
+                <a:spLocks noGrp="1"/>
+              </p:cNvSpPr>
+              <p:nvPr>
+                <p:ph idx="1"/>
+              </p:nvPr>
+            </p:nvSpPr>
+            <p:spPr/>
+            <p:txBody>
+              <a:bodyPr/>
+              <a:lstStyle/>
+              <a:p>
+                <a:pPr lvl="0" indent="0" marL="0">
+                  <a:buNone/>
+                </a:pPr>
+                <a:r>
+                  <a:rPr/>
+                  <a:t>However, observations of solar wind discontinuities reveals discrepancies between</a:t>
+                </a:r>
+              </a:p>
+              <a:p>
+                <a:pPr lvl="0"/>
+                <a:r>
+                  <a:rPr/>
+                  <a:t>Alfven velocity and plasma velocity change across discontinuities</a:t>
+                </a:r>
+              </a:p>
+              <a:p>
+                <a:pPr lvl="0"/>
+                <a:r>
+                  <a:rPr/>
+                  <a:t>Anisotropic MHD theory-predicted and directly measured ion anisotropies</a:t>
+                </a:r>
+              </a:p>
+              <a:p>
+                <a:pPr lvl="0" indent="0" marL="0">
+                  <a:buNone/>
+                </a:pPr>
+                <a:r>
+                  <a:rPr/>
+                  <a:t>Multifluid theory is proposed to address these discrepancies. The basic idea is that we could have zero bulk velocity with non zero pressure.</a:t>
+                </a:r>
+              </a:p>
+              <a:p>
+                <a:pPr lvl="0" indent="0" marL="0">
+                  <a:spcBef>
+                    <a:spcPts val="3000"/>
+                  </a:spcBef>
+                  <a:buNone/>
+                </a:pPr>
+                <a:r>
+                  <a:rPr b="1"/>
+                  <a:t>MHD in a nutshell</a:t>
+                </a:r>
+              </a:p>
+              <a:p>
+                <a:pPr lvl="0" indent="0" marL="0">
+                  <a:buNone/>
+                </a:pPr>
+                <a14:m>
+                  <m:oMathPara xmlns:m="http://schemas.openxmlformats.org/officeDocument/2006/math">
+                    <m:oMathParaPr>
+                      <m:jc m:val="center"/>
+                    </m:oMathParaPr>
+                    <m:oMath>
+                      <m:m>
+                        <m:mPr>
+                          <m:baseJc m:val="center"/>
+                          <m:plcHide m:val="on"/>
+                          <m:mcs>
+                            <m:mc>
+                              <m:mcPr>
+                                <m:mcJc m:val="right"/>
+                                <m:count m:val="1"/>
+                              </m:mcPr>
+                            </m:mc>
+                            <m:mc>
+                              <m:mcPr>
+                                <m:mcJc m:val="left"/>
+                                <m:count m:val="1"/>
+                              </m:mcPr>
+                            </m:mc>
+                          </m:mcs>
+                        </m:mPr>
+                        <m:mr>
+                          <m:e/>
+                          <m:e>
+                            <m:f>
+                              <m:fPr>
+                                <m:type m:val="bar"/>
+                              </m:fPr>
+                              <m:num>
+                                <m:r>
+                                  <m:rPr>
+                                    <m:sty m:val="p"/>
+                                  </m:rPr>
+                                  <m:t>∂</m:t>
+                                </m:r>
+                                <m:r>
+                                  <m:t>ρ</m:t>
+                                </m:r>
+                              </m:num>
+                              <m:den>
+                                <m:r>
+                                  <m:rPr>
+                                    <m:sty m:val="p"/>
+                                  </m:rPr>
+                                  <m:t>∂</m:t>
+                                </m:r>
+                                <m:r>
+                                  <m:t>t</m:t>
+                                </m:r>
+                              </m:den>
+                            </m:f>
+                            <m:r>
+                              <m:rPr>
+                                <m:sty m:val="p"/>
+                              </m:rPr>
+                              <m:t>+</m:t>
+                            </m:r>
+                            <m:d>
+                              <m:dPr>
+                                <m:begChr m:val="("/>
+                                <m:endChr m:val=")"/>
+                                <m:sepChr m:val=""/>
+                                <m:grow/>
+                              </m:dPr>
+                              <m:e>
+                                <m:acc>
+                                  <m:accPr>
+                                    <m:chr m:val="⃗"/>
+                                  </m:accPr>
+                                  <m:e>
+                                    <m:r>
+                                      <m:t>V</m:t>
+                                    </m:r>
+                                  </m:e>
+                                </m:acc>
+                                <m:r>
+                                  <m:rPr>
+                                    <m:sty m:val="p"/>
+                                  </m:rPr>
+                                  <m:t>⋅</m:t>
+                                </m:r>
+                                <m:r>
+                                  <m:rPr>
+                                    <m:sty m:val="p"/>
+                                  </m:rPr>
+                                  <m:t>∇</m:t>
+                                </m:r>
+                              </m:e>
+                            </m:d>
+                            <m:r>
+                              <m:t>ρ</m:t>
+                            </m:r>
+                            <m:r>
+                              <m:rPr>
+                                <m:sty m:val="p"/>
+                              </m:rPr>
+                              <m:t>+</m:t>
+                            </m:r>
+                            <m:r>
+                              <m:t>ρ</m:t>
+                            </m:r>
+                            <m:r>
+                              <m:rPr>
+                                <m:sty m:val="p"/>
+                              </m:rPr>
+                              <m:t>∇</m:t>
+                            </m:r>
+                            <m:r>
+                              <m:rPr>
+                                <m:sty m:val="p"/>
+                              </m:rPr>
+                              <m:t>⋅</m:t>
+                            </m:r>
+                            <m:acc>
+                              <m:accPr>
+                                <m:chr m:val="⃗"/>
+                              </m:accPr>
+                              <m:e>
+                                <m:r>
+                                  <m:t>V</m:t>
+                                </m:r>
+                              </m:e>
+                            </m:acc>
+                            <m:r>
+                              <m:rPr>
+                                <m:sty m:val="p"/>
+                              </m:rPr>
+                              <m:t>=</m:t>
+                            </m:r>
+                            <m:r>
+                              <m:t>0</m:t>
+                            </m:r>
+                          </m:e>
+                        </m:mr>
+                        <m:mr>
+                          <m:e/>
+                          <m:e>
+                            <m:r>
+                              <m:t>ρ</m:t>
+                            </m:r>
+                            <m:d>
+                              <m:dPr>
+                                <m:begChr m:val="["/>
+                                <m:endChr m:val="]"/>
+                                <m:sepChr m:val=""/>
+                                <m:grow/>
+                              </m:dPr>
+                              <m:e>
+                                <m:f>
+                                  <m:fPr>
+                                    <m:type m:val="bar"/>
+                                  </m:fPr>
+                                  <m:num>
+                                    <m:r>
+                                      <m:rPr>
+                                        <m:sty m:val="p"/>
+                                      </m:rPr>
+                                      <m:t>∂</m:t>
+                                    </m:r>
+                                    <m:acc>
+                                      <m:accPr>
+                                        <m:chr m:val="⃗"/>
+                                      </m:accPr>
+                                      <m:e>
+                                        <m:r>
+                                          <m:t>V</m:t>
+                                        </m:r>
+                                      </m:e>
+                                    </m:acc>
+                                  </m:num>
+                                  <m:den>
+                                    <m:r>
+                                      <m:rPr>
+                                        <m:sty m:val="p"/>
+                                      </m:rPr>
+                                      <m:t>∂</m:t>
+                                    </m:r>
+                                    <m:r>
+                                      <m:t>t</m:t>
+                                    </m:r>
+                                  </m:den>
+                                </m:f>
+                                <m:r>
+                                  <m:rPr>
+                                    <m:sty m:val="p"/>
+                                  </m:rPr>
+                                  <m:t>+</m:t>
+                                </m:r>
+                                <m:d>
+                                  <m:dPr>
+                                    <m:begChr m:val="("/>
+                                    <m:endChr m:val=")"/>
+                                    <m:sepChr m:val=""/>
+                                    <m:grow/>
+                                  </m:dPr>
+                                  <m:e>
+                                    <m:acc>
+                                      <m:accPr>
+                                        <m:chr m:val="⃗"/>
+                                      </m:accPr>
+                                      <m:e>
+                                        <m:r>
+                                          <m:t>V</m:t>
+                                        </m:r>
+                                      </m:e>
+                                    </m:acc>
+                                    <m:r>
+                                      <m:rPr>
+                                        <m:sty m:val="p"/>
+                                      </m:rPr>
+                                      <m:t>⋅</m:t>
+                                    </m:r>
+                                    <m:r>
+                                      <m:rPr>
+                                        <m:sty m:val="p"/>
+                                      </m:rPr>
+                                      <m:t>∇</m:t>
+                                    </m:r>
+                                  </m:e>
+                                </m:d>
+                                <m:acc>
+                                  <m:accPr>
+                                    <m:chr m:val="⃗"/>
+                                  </m:accPr>
+                                  <m:e>
+                                    <m:r>
+                                      <m:t>V</m:t>
+                                    </m:r>
+                                  </m:e>
+                                </m:acc>
+                              </m:e>
+                            </m:d>
+                            <m:r>
+                              <m:rPr>
+                                <m:sty m:val="p"/>
+                              </m:rPr>
+                              <m:t>+</m:t>
+                            </m:r>
+                            <m:r>
+                              <m:rPr>
+                                <m:sty m:val="p"/>
+                              </m:rPr>
+                              <m:t>∇</m:t>
+                            </m:r>
+                            <m:r>
+                              <m:t>p</m:t>
+                            </m:r>
+                            <m:r>
+                              <m:rPr>
+                                <m:sty m:val="p"/>
+                              </m:rPr>
+                              <m:t>=</m:t>
+                            </m:r>
+                            <m:acc>
+                              <m:accPr>
+                                <m:chr m:val="⃗"/>
+                              </m:accPr>
+                              <m:e>
+                                <m:r>
+                                  <m:t>J</m:t>
+                                </m:r>
+                              </m:e>
+                            </m:acc>
+                            <m:r>
+                              <m:rPr>
+                                <m:sty m:val="p"/>
+                              </m:rPr>
+                              <m:t>×</m:t>
+                            </m:r>
+                            <m:acc>
+                              <m:accPr>
+                                <m:chr m:val="⃗"/>
+                              </m:accPr>
+                              <m:e>
+                                <m:r>
+                                  <m:t>B</m:t>
+                                </m:r>
+                              </m:e>
+                            </m:acc>
+                          </m:e>
+                        </m:mr>
+                        <m:mr>
+                          <m:e/>
+                          <m:e>
+                            <m:r>
+                              <m:t>p</m:t>
+                            </m:r>
+                            <m:r>
+                              <m:rPr>
+                                <m:sty m:val="p"/>
+                              </m:rPr>
+                              <m:t>=</m:t>
+                            </m:r>
+                            <m:r>
+                              <m:t>α</m:t>
+                            </m:r>
+                            <m:sSup>
+                              <m:e>
+                                <m:r>
+                                  <m:t>ρ</m:t>
+                                </m:r>
+                              </m:e>
+                              <m:sup>
+                                <m:r>
+                                  <m:t>γ</m:t>
+                                </m:r>
+                              </m:sup>
+                            </m:sSup>
+                          </m:e>
+                        </m:mr>
+                        <m:mr>
+                          <m:e/>
+                          <m:e>
+                            <m:r>
+                              <m:rPr>
+                                <m:sty m:val="p"/>
+                              </m:rPr>
+                              <m:t>∇</m:t>
+                            </m:r>
+                            <m:r>
+                              <m:rPr>
+                                <m:sty m:val="p"/>
+                              </m:rPr>
+                              <m:t>×</m:t>
+                            </m:r>
+                            <m:acc>
+                              <m:accPr>
+                                <m:chr m:val="⃗"/>
+                              </m:accPr>
+                              <m:e>
+                                <m:r>
+                                  <m:t>B</m:t>
+                                </m:r>
+                              </m:e>
+                            </m:acc>
+                            <m:r>
+                              <m:rPr>
+                                <m:sty m:val="p"/>
+                              </m:rPr>
+                              <m:t>=</m:t>
+                            </m:r>
+                            <m:sSub>
+                              <m:e>
+                                <m:r>
+                                  <m:t>μ</m:t>
+                                </m:r>
+                              </m:e>
+                              <m:sub>
+                                <m:r>
+                                  <m:t>0</m:t>
+                                </m:r>
+                              </m:sub>
+                            </m:sSub>
+                            <m:acc>
+                              <m:accPr>
+                                <m:chr m:val="⃗"/>
+                              </m:accPr>
+                              <m:e>
+                                <m:r>
+                                  <m:t>J</m:t>
+                                </m:r>
+                              </m:e>
+                            </m:acc>
+                          </m:e>
+                        </m:mr>
+                        <m:mr>
+                          <m:e/>
+                          <m:e>
+                            <m:f>
+                              <m:fPr>
+                                <m:type m:val="bar"/>
+                              </m:fPr>
+                              <m:num>
+                                <m:r>
+                                  <m:rPr>
+                                    <m:sty m:val="p"/>
+                                  </m:rPr>
+                                  <m:t>∂</m:t>
+                                </m:r>
+                                <m:acc>
+                                  <m:accPr>
+                                    <m:chr m:val="⃗"/>
+                                  </m:accPr>
+                                  <m:e>
+                                    <m:r>
+                                      <m:t>B</m:t>
+                                    </m:r>
+                                  </m:e>
+                                </m:acc>
+                              </m:num>
+                              <m:den>
+                                <m:r>
+                                  <m:rPr>
+                                    <m:sty m:val="p"/>
+                                  </m:rPr>
+                                  <m:t>∂</m:t>
+                                </m:r>
+                                <m:r>
+                                  <m:t>t</m:t>
+                                </m:r>
+                              </m:den>
+                            </m:f>
+                            <m:r>
+                              <m:rPr>
+                                <m:sty m:val="p"/>
+                              </m:rPr>
+                              <m:t>=</m:t>
+                            </m:r>
+                            <m:r>
+                              <m:rPr>
+                                <m:sty m:val="p"/>
+                              </m:rPr>
+                              <m:t>∇</m:t>
+                            </m:r>
+                            <m:r>
+                              <m:rPr>
+                                <m:sty m:val="p"/>
+                              </m:rPr>
+                              <m:t>×</m:t>
+                            </m:r>
+                            <m:d>
+                              <m:dPr>
+                                <m:begChr m:val="("/>
+                                <m:endChr m:val=")"/>
+                                <m:sepChr m:val=""/>
+                                <m:grow/>
+                              </m:dPr>
+                              <m:e>
+                                <m:acc>
+                                  <m:accPr>
+                                    <m:chr m:val="⃗"/>
+                                  </m:accPr>
+                                  <m:e>
+                                    <m:r>
+                                      <m:t>V</m:t>
+                                    </m:r>
+                                  </m:e>
+                                </m:acc>
+                                <m:r>
+                                  <m:rPr>
+                                    <m:sty m:val="p"/>
+                                  </m:rPr>
+                                  <m:t>×</m:t>
+                                </m:r>
+                                <m:acc>
+                                  <m:accPr>
+                                    <m:chr m:val="⃗"/>
+                                  </m:accPr>
+                                  <m:e>
+                                    <m:r>
+                                      <m:t>B</m:t>
+                                    </m:r>
+                                  </m:e>
+                                </m:acc>
+                              </m:e>
+                            </m:d>
+                          </m:e>
+                        </m:mr>
+                      </m:m>
+                    </m:oMath>
+                  </m:oMathPara>
+                </a14:m>
+              </a:p>
+            </p:txBody>
+          </p:sp>
+        </mc:Choice>
+      </mc:AlternateContent>
     </p:spTree>
   </p:cSld>
   <p:timing>

</xml_diff>